<commit_message>
start of the report
</commit_message>
<xml_diff>
--- a/Prepoznavanje ročno zapisanih števk.pptx
+++ b/Prepoznavanje ročno zapisanih števk.pptx
@@ -166,7 +166,7 @@
           <a:noFill/>
           <a:extLst>
             <a:ext uri="{909E8E84-426E-40dd-AFC4-6F175D3DCCD1}">
-              <a14:hiddenFill xmlns="" xmlns:a14="http://schemas.microsoft.com/office/drawing/2010/main">
+              <a14:hiddenFill xmlns:a14="http://schemas.microsoft.com/office/drawing/2010/main" xmlns="">
                 <a:solidFill>
                   <a:srgbClr val="FFFFFF"/>
                 </a:solidFill>
@@ -226,7 +226,7 @@
             </a:ln>
             <a:extLst>
               <a:ext uri="{91240B29-F687-4f45-9708-019B960494DF}">
-                <a14:hiddenLine xmlns="" xmlns:a14="http://schemas.microsoft.com/office/drawing/2010/main" w="9525">
+                <a14:hiddenLine xmlns:a14="http://schemas.microsoft.com/office/drawing/2010/main" xmlns="" w="9525">
                   <a:solidFill>
                     <a:srgbClr val="000000"/>
                   </a:solidFill>
@@ -316,7 +316,7 @@
             </a:ln>
             <a:extLst>
               <a:ext uri="{91240B29-F687-4f45-9708-019B960494DF}">
-                <a14:hiddenLine xmlns="" xmlns:a14="http://schemas.microsoft.com/office/drawing/2010/main" w="9525">
+                <a14:hiddenLine xmlns:a14="http://schemas.microsoft.com/office/drawing/2010/main" xmlns="" w="9525">
                   <a:solidFill>
                     <a:srgbClr val="000000"/>
                   </a:solidFill>
@@ -406,7 +406,7 @@
             </a:ln>
             <a:extLst>
               <a:ext uri="{91240B29-F687-4f45-9708-019B960494DF}">
-                <a14:hiddenLine xmlns="" xmlns:a14="http://schemas.microsoft.com/office/drawing/2010/main" w="9525">
+                <a14:hiddenLine xmlns:a14="http://schemas.microsoft.com/office/drawing/2010/main" xmlns="" w="9525">
                   <a:solidFill>
                     <a:srgbClr val="000000"/>
                   </a:solidFill>
@@ -440,7 +440,7 @@
             </a:ln>
             <a:extLst>
               <a:ext uri="{91240B29-F687-4f45-9708-019B960494DF}">
-                <a14:hiddenLine xmlns="" xmlns:a14="http://schemas.microsoft.com/office/drawing/2010/main" w="9525">
+                <a14:hiddenLine xmlns:a14="http://schemas.microsoft.com/office/drawing/2010/main" xmlns="" w="9525">
                   <a:solidFill>
                     <a:srgbClr val="000000"/>
                   </a:solidFill>
@@ -530,7 +530,7 @@
             </a:ln>
             <a:extLst>
               <a:ext uri="{91240B29-F687-4f45-9708-019B960494DF}">
-                <a14:hiddenLine xmlns="" xmlns:a14="http://schemas.microsoft.com/office/drawing/2010/main" w="9525">
+                <a14:hiddenLine xmlns:a14="http://schemas.microsoft.com/office/drawing/2010/main" xmlns="" w="9525">
                   <a:solidFill>
                     <a:srgbClr val="000000"/>
                   </a:solidFill>
@@ -592,7 +592,7 @@
             </a:ln>
             <a:extLst>
               <a:ext uri="{91240B29-F687-4f45-9708-019B960494DF}">
-                <a14:hiddenLine xmlns="" xmlns:a14="http://schemas.microsoft.com/office/drawing/2010/main" w="9525">
+                <a14:hiddenLine xmlns:a14="http://schemas.microsoft.com/office/drawing/2010/main" xmlns="" w="9525">
                   <a:solidFill>
                     <a:srgbClr val="000000"/>
                   </a:solidFill>
@@ -654,7 +654,7 @@
             </a:ln>
             <a:extLst>
               <a:ext uri="{91240B29-F687-4f45-9708-019B960494DF}">
-                <a14:hiddenLine xmlns="" xmlns:a14="http://schemas.microsoft.com/office/drawing/2010/main" w="9525">
+                <a14:hiddenLine xmlns:a14="http://schemas.microsoft.com/office/drawing/2010/main" xmlns="" w="9525">
                   <a:solidFill>
                     <a:srgbClr val="000000"/>
                   </a:solidFill>
@@ -744,7 +744,7 @@
             </a:ln>
             <a:extLst>
               <a:ext uri="{91240B29-F687-4f45-9708-019B960494DF}">
-                <a14:hiddenLine xmlns="" xmlns:a14="http://schemas.microsoft.com/office/drawing/2010/main" w="9525">
+                <a14:hiddenLine xmlns:a14="http://schemas.microsoft.com/office/drawing/2010/main" xmlns="" w="9525">
                   <a:solidFill>
                     <a:srgbClr val="000000"/>
                   </a:solidFill>
@@ -806,7 +806,7 @@
             </a:ln>
             <a:extLst>
               <a:ext uri="{91240B29-F687-4f45-9708-019B960494DF}">
-                <a14:hiddenLine xmlns="" xmlns:a14="http://schemas.microsoft.com/office/drawing/2010/main" w="9525">
+                <a14:hiddenLine xmlns:a14="http://schemas.microsoft.com/office/drawing/2010/main" xmlns="" w="9525">
                   <a:solidFill>
                     <a:srgbClr val="000000"/>
                   </a:solidFill>
@@ -868,7 +868,7 @@
             </a:ln>
             <a:extLst>
               <a:ext uri="{91240B29-F687-4f45-9708-019B960494DF}">
-                <a14:hiddenLine xmlns="" xmlns:a14="http://schemas.microsoft.com/office/drawing/2010/main" w="9525">
+                <a14:hiddenLine xmlns:a14="http://schemas.microsoft.com/office/drawing/2010/main" xmlns="" w="9525">
                   <a:solidFill>
                     <a:srgbClr val="000000"/>
                   </a:solidFill>
@@ -958,7 +958,7 @@
             </a:ln>
             <a:extLst>
               <a:ext uri="{91240B29-F687-4f45-9708-019B960494DF}">
-                <a14:hiddenLine xmlns="" xmlns:a14="http://schemas.microsoft.com/office/drawing/2010/main" w="9525">
+                <a14:hiddenLine xmlns:a14="http://schemas.microsoft.com/office/drawing/2010/main" xmlns="" w="9525">
                   <a:solidFill>
                     <a:srgbClr val="000000"/>
                   </a:solidFill>
@@ -1048,7 +1048,7 @@
             </a:ln>
             <a:extLst>
               <a:ext uri="{91240B29-F687-4f45-9708-019B960494DF}">
-                <a14:hiddenLine xmlns="" xmlns:a14="http://schemas.microsoft.com/office/drawing/2010/main" w="9525">
+                <a14:hiddenLine xmlns:a14="http://schemas.microsoft.com/office/drawing/2010/main" xmlns="" w="9525">
                   <a:solidFill>
                     <a:srgbClr val="000000"/>
                   </a:solidFill>
@@ -1110,7 +1110,7 @@
             </a:ln>
             <a:extLst>
               <a:ext uri="{91240B29-F687-4f45-9708-019B960494DF}">
-                <a14:hiddenLine xmlns="" xmlns:a14="http://schemas.microsoft.com/office/drawing/2010/main" w="9525">
+                <a14:hiddenLine xmlns:a14="http://schemas.microsoft.com/office/drawing/2010/main" xmlns="" w="9525">
                   <a:solidFill>
                     <a:srgbClr val="000000"/>
                   </a:solidFill>
@@ -1220,7 +1220,7 @@
             </a:ln>
             <a:extLst>
               <a:ext uri="{91240B29-F687-4f45-9708-019B960494DF}">
-                <a14:hiddenLine xmlns="" xmlns:a14="http://schemas.microsoft.com/office/drawing/2010/main" w="9525">
+                <a14:hiddenLine xmlns:a14="http://schemas.microsoft.com/office/drawing/2010/main" xmlns="" w="9525">
                   <a:solidFill>
                     <a:srgbClr val="000000"/>
                   </a:solidFill>
@@ -1282,7 +1282,7 @@
             </a:ln>
             <a:extLst>
               <a:ext uri="{91240B29-F687-4f45-9708-019B960494DF}">
-                <a14:hiddenLine xmlns="" xmlns:a14="http://schemas.microsoft.com/office/drawing/2010/main" w="9525">
+                <a14:hiddenLine xmlns:a14="http://schemas.microsoft.com/office/drawing/2010/main" xmlns="" w="9525">
                   <a:solidFill>
                     <a:srgbClr val="000000"/>
                   </a:solidFill>
@@ -1372,7 +1372,7 @@
             </a:ln>
             <a:extLst>
               <a:ext uri="{91240B29-F687-4f45-9708-019B960494DF}">
-                <a14:hiddenLine xmlns="" xmlns:a14="http://schemas.microsoft.com/office/drawing/2010/main" w="9525">
+                <a14:hiddenLine xmlns:a14="http://schemas.microsoft.com/office/drawing/2010/main" xmlns="" w="9525">
                   <a:solidFill>
                     <a:srgbClr val="000000"/>
                   </a:solidFill>
@@ -1462,7 +1462,7 @@
             </a:ln>
             <a:extLst>
               <a:ext uri="{91240B29-F687-4f45-9708-019B960494DF}">
-                <a14:hiddenLine xmlns="" xmlns:a14="http://schemas.microsoft.com/office/drawing/2010/main" w="9525">
+                <a14:hiddenLine xmlns:a14="http://schemas.microsoft.com/office/drawing/2010/main" xmlns="" w="9525">
                   <a:solidFill>
                     <a:srgbClr val="000000"/>
                   </a:solidFill>
@@ -1524,7 +1524,7 @@
             </a:ln>
             <a:extLst>
               <a:ext uri="{91240B29-F687-4f45-9708-019B960494DF}">
-                <a14:hiddenLine xmlns="" xmlns:a14="http://schemas.microsoft.com/office/drawing/2010/main" w="9525">
+                <a14:hiddenLine xmlns:a14="http://schemas.microsoft.com/office/drawing/2010/main" xmlns="" w="9525">
                   <a:solidFill>
                     <a:srgbClr val="000000"/>
                   </a:solidFill>
@@ -1614,7 +1614,7 @@
             </a:ln>
             <a:extLst>
               <a:ext uri="{91240B29-F687-4f45-9708-019B960494DF}">
-                <a14:hiddenLine xmlns="" xmlns:a14="http://schemas.microsoft.com/office/drawing/2010/main" w="9525">
+                <a14:hiddenLine xmlns:a14="http://schemas.microsoft.com/office/drawing/2010/main" xmlns="" w="9525">
                   <a:solidFill>
                     <a:srgbClr val="000000"/>
                   </a:solidFill>
@@ -1704,7 +1704,7 @@
             </a:ln>
             <a:extLst>
               <a:ext uri="{91240B29-F687-4f45-9708-019B960494DF}">
-                <a14:hiddenLine xmlns="" xmlns:a14="http://schemas.microsoft.com/office/drawing/2010/main" w="9525">
+                <a14:hiddenLine xmlns:a14="http://schemas.microsoft.com/office/drawing/2010/main" xmlns="" w="9525">
                   <a:solidFill>
                     <a:srgbClr val="000000"/>
                   </a:solidFill>
@@ -1760,7 +1760,7 @@
             </a:ln>
             <a:extLst>
               <a:ext uri="{91240B29-F687-4f45-9708-019B960494DF}">
-                <a14:hiddenLine xmlns="" xmlns:a14="http://schemas.microsoft.com/office/drawing/2010/main" w="9525">
+                <a14:hiddenLine xmlns:a14="http://schemas.microsoft.com/office/drawing/2010/main" xmlns="" w="9525">
                   <a:solidFill>
                     <a:srgbClr val="000000"/>
                   </a:solidFill>
@@ -1850,7 +1850,7 @@
             </a:ln>
             <a:extLst>
               <a:ext uri="{91240B29-F687-4f45-9708-019B960494DF}">
-                <a14:hiddenLine xmlns="" xmlns:a14="http://schemas.microsoft.com/office/drawing/2010/main" w="9525">
+                <a14:hiddenLine xmlns:a14="http://schemas.microsoft.com/office/drawing/2010/main" xmlns="" w="9525">
                   <a:solidFill>
                     <a:srgbClr val="000000"/>
                   </a:solidFill>
@@ -1906,7 +1906,7 @@
             </a:ln>
             <a:extLst>
               <a:ext uri="{91240B29-F687-4f45-9708-019B960494DF}">
-                <a14:hiddenLine xmlns="" xmlns:a14="http://schemas.microsoft.com/office/drawing/2010/main" w="9525">
+                <a14:hiddenLine xmlns:a14="http://schemas.microsoft.com/office/drawing/2010/main" xmlns="" w="9525">
                   <a:solidFill>
                     <a:srgbClr val="000000"/>
                   </a:solidFill>
@@ -1996,7 +1996,7 @@
             </a:ln>
             <a:extLst>
               <a:ext uri="{91240B29-F687-4f45-9708-019B960494DF}">
-                <a14:hiddenLine xmlns="" xmlns:a14="http://schemas.microsoft.com/office/drawing/2010/main" w="9525">
+                <a14:hiddenLine xmlns:a14="http://schemas.microsoft.com/office/drawing/2010/main" xmlns="" w="9525">
                   <a:solidFill>
                     <a:srgbClr val="000000"/>
                   </a:solidFill>
@@ -2064,7 +2064,7 @@
             </a:ln>
             <a:extLst>
               <a:ext uri="{91240B29-F687-4f45-9708-019B960494DF}">
-                <a14:hiddenLine xmlns="" xmlns:a14="http://schemas.microsoft.com/office/drawing/2010/main" w="9525">
+                <a14:hiddenLine xmlns:a14="http://schemas.microsoft.com/office/drawing/2010/main" xmlns="" w="9525">
                   <a:solidFill>
                     <a:srgbClr val="000000"/>
                   </a:solidFill>
@@ -2154,7 +2154,7 @@
             </a:ln>
             <a:extLst>
               <a:ext uri="{91240B29-F687-4f45-9708-019B960494DF}">
-                <a14:hiddenLine xmlns="" xmlns:a14="http://schemas.microsoft.com/office/drawing/2010/main" w="9525">
+                <a14:hiddenLine xmlns:a14="http://schemas.microsoft.com/office/drawing/2010/main" xmlns="" w="9525">
                   <a:solidFill>
                     <a:srgbClr val="000000"/>
                   </a:solidFill>
@@ -2222,7 +2222,7 @@
             </a:ln>
             <a:extLst>
               <a:ext uri="{91240B29-F687-4f45-9708-019B960494DF}">
-                <a14:hiddenLine xmlns="" xmlns:a14="http://schemas.microsoft.com/office/drawing/2010/main" w="9525">
+                <a14:hiddenLine xmlns:a14="http://schemas.microsoft.com/office/drawing/2010/main" xmlns="" w="9525">
                   <a:solidFill>
                     <a:srgbClr val="000000"/>
                   </a:solidFill>
@@ -2312,7 +2312,7 @@
             </a:ln>
             <a:extLst>
               <a:ext uri="{91240B29-F687-4f45-9708-019B960494DF}">
-                <a14:hiddenLine xmlns="" xmlns:a14="http://schemas.microsoft.com/office/drawing/2010/main" w="9525">
+                <a14:hiddenLine xmlns:a14="http://schemas.microsoft.com/office/drawing/2010/main" xmlns="" w="9525">
                   <a:solidFill>
                     <a:srgbClr val="000000"/>
                   </a:solidFill>
@@ -2346,7 +2346,7 @@
             </a:ln>
             <a:extLst>
               <a:ext uri="{91240B29-F687-4f45-9708-019B960494DF}">
-                <a14:hiddenLine xmlns="" xmlns:a14="http://schemas.microsoft.com/office/drawing/2010/main" w="9525">
+                <a14:hiddenLine xmlns:a14="http://schemas.microsoft.com/office/drawing/2010/main" xmlns="" w="9525">
                   <a:solidFill>
                     <a:srgbClr val="000000"/>
                   </a:solidFill>
@@ -2436,7 +2436,7 @@
             </a:ln>
             <a:extLst>
               <a:ext uri="{91240B29-F687-4f45-9708-019B960494DF}">
-                <a14:hiddenLine xmlns="" xmlns:a14="http://schemas.microsoft.com/office/drawing/2010/main" w="9525">
+                <a14:hiddenLine xmlns:a14="http://schemas.microsoft.com/office/drawing/2010/main" xmlns="" w="9525">
                   <a:solidFill>
                     <a:srgbClr val="000000"/>
                   </a:solidFill>
@@ -2498,7 +2498,7 @@
             </a:ln>
             <a:extLst>
               <a:ext uri="{91240B29-F687-4f45-9708-019B960494DF}">
-                <a14:hiddenLine xmlns="" xmlns:a14="http://schemas.microsoft.com/office/drawing/2010/main" w="9525">
+                <a14:hiddenLine xmlns:a14="http://schemas.microsoft.com/office/drawing/2010/main" xmlns="" w="9525">
                   <a:solidFill>
                     <a:srgbClr val="000000"/>
                   </a:solidFill>
@@ -2560,7 +2560,7 @@
             </a:ln>
             <a:extLst>
               <a:ext uri="{91240B29-F687-4f45-9708-019B960494DF}">
-                <a14:hiddenLine xmlns="" xmlns:a14="http://schemas.microsoft.com/office/drawing/2010/main" w="9525">
+                <a14:hiddenLine xmlns:a14="http://schemas.microsoft.com/office/drawing/2010/main" xmlns="" w="9525">
                   <a:solidFill>
                     <a:srgbClr val="000000"/>
                   </a:solidFill>
@@ -2650,7 +2650,7 @@
             </a:ln>
             <a:extLst>
               <a:ext uri="{91240B29-F687-4f45-9708-019B960494DF}">
-                <a14:hiddenLine xmlns="" xmlns:a14="http://schemas.microsoft.com/office/drawing/2010/main" w="9525">
+                <a14:hiddenLine xmlns:a14="http://schemas.microsoft.com/office/drawing/2010/main" xmlns="" w="9525">
                   <a:solidFill>
                     <a:srgbClr val="000000"/>
                   </a:solidFill>
@@ -2718,7 +2718,7 @@
             </a:ln>
             <a:extLst>
               <a:ext uri="{91240B29-F687-4f45-9708-019B960494DF}">
-                <a14:hiddenLine xmlns="" xmlns:a14="http://schemas.microsoft.com/office/drawing/2010/main" w="9525">
+                <a14:hiddenLine xmlns:a14="http://schemas.microsoft.com/office/drawing/2010/main" xmlns="" w="9525">
                   <a:solidFill>
                     <a:srgbClr val="000000"/>
                   </a:solidFill>
@@ -2780,7 +2780,7 @@
             </a:ln>
             <a:extLst>
               <a:ext uri="{91240B29-F687-4f45-9708-019B960494DF}">
-                <a14:hiddenLine xmlns="" xmlns:a14="http://schemas.microsoft.com/office/drawing/2010/main" w="9525">
+                <a14:hiddenLine xmlns:a14="http://schemas.microsoft.com/office/drawing/2010/main" xmlns="" w="9525">
                   <a:solidFill>
                     <a:srgbClr val="000000"/>
                   </a:solidFill>
@@ -2870,7 +2870,7 @@
             </a:ln>
             <a:extLst>
               <a:ext uri="{91240B29-F687-4f45-9708-019B960494DF}">
-                <a14:hiddenLine xmlns="" xmlns:a14="http://schemas.microsoft.com/office/drawing/2010/main" w="9525">
+                <a14:hiddenLine xmlns:a14="http://schemas.microsoft.com/office/drawing/2010/main" xmlns="" w="9525">
                   <a:solidFill>
                     <a:srgbClr val="000000"/>
                   </a:solidFill>
@@ -2932,7 +2932,7 @@
             </a:ln>
             <a:extLst>
               <a:ext uri="{91240B29-F687-4f45-9708-019B960494DF}">
-                <a14:hiddenLine xmlns="" xmlns:a14="http://schemas.microsoft.com/office/drawing/2010/main" w="9525">
+                <a14:hiddenLine xmlns:a14="http://schemas.microsoft.com/office/drawing/2010/main" xmlns="" w="9525">
                   <a:solidFill>
                     <a:srgbClr val="000000"/>
                   </a:solidFill>
@@ -3022,7 +3022,7 @@
             </a:ln>
             <a:extLst>
               <a:ext uri="{91240B29-F687-4f45-9708-019B960494DF}">
-                <a14:hiddenLine xmlns="" xmlns:a14="http://schemas.microsoft.com/office/drawing/2010/main" w="9525">
+                <a14:hiddenLine xmlns:a14="http://schemas.microsoft.com/office/drawing/2010/main" xmlns="" w="9525">
                   <a:solidFill>
                     <a:srgbClr val="000000"/>
                   </a:solidFill>
@@ -3084,7 +3084,7 @@
             </a:ln>
             <a:extLst>
               <a:ext uri="{91240B29-F687-4f45-9708-019B960494DF}">
-                <a14:hiddenLine xmlns="" xmlns:a14="http://schemas.microsoft.com/office/drawing/2010/main" w="9525">
+                <a14:hiddenLine xmlns:a14="http://schemas.microsoft.com/office/drawing/2010/main" xmlns="" w="9525">
                   <a:solidFill>
                     <a:srgbClr val="000000"/>
                   </a:solidFill>
@@ -3174,7 +3174,7 @@
             </a:ln>
             <a:extLst>
               <a:ext uri="{91240B29-F687-4f45-9708-019B960494DF}">
-                <a14:hiddenLine xmlns="" xmlns:a14="http://schemas.microsoft.com/office/drawing/2010/main" w="9525">
+                <a14:hiddenLine xmlns:a14="http://schemas.microsoft.com/office/drawing/2010/main" xmlns="" w="9525">
                   <a:solidFill>
                     <a:srgbClr val="000000"/>
                   </a:solidFill>
@@ -3208,7 +3208,7 @@
             </a:ln>
             <a:extLst>
               <a:ext uri="{91240B29-F687-4f45-9708-019B960494DF}">
-                <a14:hiddenLine xmlns="" xmlns:a14="http://schemas.microsoft.com/office/drawing/2010/main" w="9525">
+                <a14:hiddenLine xmlns:a14="http://schemas.microsoft.com/office/drawing/2010/main" xmlns="" w="9525">
                   <a:solidFill>
                     <a:srgbClr val="000000"/>
                   </a:solidFill>
@@ -3273,7 +3273,7 @@
             </a:ln>
             <a:extLst>
               <a:ext uri="{91240B29-F687-4f45-9708-019B960494DF}">
-                <a14:hiddenLine xmlns="" xmlns:a14="http://schemas.microsoft.com/office/drawing/2010/main" w="9525">
+                <a14:hiddenLine xmlns:a14="http://schemas.microsoft.com/office/drawing/2010/main" xmlns="" w="9525">
                   <a:solidFill>
                     <a:srgbClr val="000000"/>
                   </a:solidFill>
@@ -3363,7 +3363,7 @@
             </a:ln>
             <a:extLst>
               <a:ext uri="{91240B29-F687-4f45-9708-019B960494DF}">
-                <a14:hiddenLine xmlns="" xmlns:a14="http://schemas.microsoft.com/office/drawing/2010/main" w="9525">
+                <a14:hiddenLine xmlns:a14="http://schemas.microsoft.com/office/drawing/2010/main" xmlns="" w="9525">
                   <a:solidFill>
                     <a:srgbClr val="000000"/>
                   </a:solidFill>
@@ -3425,7 +3425,7 @@
             </a:ln>
             <a:extLst>
               <a:ext uri="{91240B29-F687-4f45-9708-019B960494DF}">
-                <a14:hiddenLine xmlns="" xmlns:a14="http://schemas.microsoft.com/office/drawing/2010/main" w="9525">
+                <a14:hiddenLine xmlns:a14="http://schemas.microsoft.com/office/drawing/2010/main" xmlns="" w="9525">
                   <a:solidFill>
                     <a:srgbClr val="000000"/>
                   </a:solidFill>
@@ -3515,7 +3515,7 @@
             </a:ln>
             <a:extLst>
               <a:ext uri="{91240B29-F687-4f45-9708-019B960494DF}">
-                <a14:hiddenLine xmlns="" xmlns:a14="http://schemas.microsoft.com/office/drawing/2010/main" w="9525">
+                <a14:hiddenLine xmlns:a14="http://schemas.microsoft.com/office/drawing/2010/main" xmlns="" w="9525">
                   <a:solidFill>
                     <a:srgbClr val="000000"/>
                   </a:solidFill>
@@ -3605,7 +3605,7 @@
             </a:ln>
             <a:extLst>
               <a:ext uri="{91240B29-F687-4f45-9708-019B960494DF}">
-                <a14:hiddenLine xmlns="" xmlns:a14="http://schemas.microsoft.com/office/drawing/2010/main" w="9525">
+                <a14:hiddenLine xmlns:a14="http://schemas.microsoft.com/office/drawing/2010/main" xmlns="" w="9525">
                   <a:solidFill>
                     <a:srgbClr val="000000"/>
                   </a:solidFill>
@@ -3670,7 +3670,7 @@
             </a:ln>
             <a:extLst>
               <a:ext uri="{91240B29-F687-4f45-9708-019B960494DF}">
-                <a14:hiddenLine xmlns="" xmlns:a14="http://schemas.microsoft.com/office/drawing/2010/main" w="9525">
+                <a14:hiddenLine xmlns:a14="http://schemas.microsoft.com/office/drawing/2010/main" xmlns="" w="9525">
                   <a:solidFill>
                     <a:srgbClr val="000000"/>
                   </a:solidFill>
@@ -3732,7 +3732,7 @@
             </a:ln>
             <a:extLst>
               <a:ext uri="{91240B29-F687-4f45-9708-019B960494DF}">
-                <a14:hiddenLine xmlns="" xmlns:a14="http://schemas.microsoft.com/office/drawing/2010/main" w="9525">
+                <a14:hiddenLine xmlns:a14="http://schemas.microsoft.com/office/drawing/2010/main" xmlns="" w="9525">
                   <a:solidFill>
                     <a:srgbClr val="000000"/>
                   </a:solidFill>
@@ -3822,7 +3822,7 @@
             </a:ln>
             <a:extLst>
               <a:ext uri="{91240B29-F687-4f45-9708-019B960494DF}">
-                <a14:hiddenLine xmlns="" xmlns:a14="http://schemas.microsoft.com/office/drawing/2010/main" w="9525">
+                <a14:hiddenLine xmlns:a14="http://schemas.microsoft.com/office/drawing/2010/main" xmlns="" w="9525">
                   <a:solidFill>
                     <a:srgbClr val="000000"/>
                   </a:solidFill>
@@ -3912,7 +3912,7 @@
             </a:ln>
             <a:extLst>
               <a:ext uri="{91240B29-F687-4f45-9708-019B960494DF}">
-                <a14:hiddenLine xmlns="" xmlns:a14="http://schemas.microsoft.com/office/drawing/2010/main" w="9525">
+                <a14:hiddenLine xmlns:a14="http://schemas.microsoft.com/office/drawing/2010/main" xmlns="" w="9525">
                   <a:solidFill>
                     <a:srgbClr val="000000"/>
                   </a:solidFill>
@@ -3974,7 +3974,7 @@
             </a:ln>
             <a:extLst>
               <a:ext uri="{91240B29-F687-4f45-9708-019B960494DF}">
-                <a14:hiddenLine xmlns="" xmlns:a14="http://schemas.microsoft.com/office/drawing/2010/main" w="9525">
+                <a14:hiddenLine xmlns:a14="http://schemas.microsoft.com/office/drawing/2010/main" xmlns="" w="9525">
                   <a:solidFill>
                     <a:srgbClr val="000000"/>
                   </a:solidFill>
@@ -4094,7 +4094,7 @@
             </a:ln>
             <a:extLst>
               <a:ext uri="{91240B29-F687-4f45-9708-019B960494DF}">
-                <a14:hiddenLine xmlns="" xmlns:a14="http://schemas.microsoft.com/office/drawing/2010/main" w="9525">
+                <a14:hiddenLine xmlns:a14="http://schemas.microsoft.com/office/drawing/2010/main" xmlns="" w="9525">
                   <a:solidFill>
                     <a:srgbClr val="000000"/>
                   </a:solidFill>
@@ -4162,7 +4162,7 @@
             </a:ln>
             <a:extLst>
               <a:ext uri="{91240B29-F687-4f45-9708-019B960494DF}">
-                <a14:hiddenLine xmlns="" xmlns:a14="http://schemas.microsoft.com/office/drawing/2010/main" w="9525">
+                <a14:hiddenLine xmlns:a14="http://schemas.microsoft.com/office/drawing/2010/main" xmlns="" w="9525">
                   <a:solidFill>
                     <a:srgbClr val="000000"/>
                   </a:solidFill>
@@ -4252,7 +4252,7 @@
             </a:ln>
             <a:extLst>
               <a:ext uri="{91240B29-F687-4f45-9708-019B960494DF}">
-                <a14:hiddenLine xmlns="" xmlns:a14="http://schemas.microsoft.com/office/drawing/2010/main" w="9525">
+                <a14:hiddenLine xmlns:a14="http://schemas.microsoft.com/office/drawing/2010/main" xmlns="" w="9525">
                   <a:solidFill>
                     <a:srgbClr val="000000"/>
                   </a:solidFill>
@@ -4392,7 +4392,7 @@
           <a:p>
             <a:fld id="{48A87A34-81AB-432B-8DAE-1953F412C126}" type="datetimeFigureOut">
               <a:rPr lang="en-US" dirty="0"/>
-              <a:t>05-Jun-18</a:t>
+              <a:t>09-Jun-18</a:t>
             </a:fld>
             <a:endParaRPr lang="en-US" dirty="0"/>
           </a:p>
@@ -4654,7 +4654,7 @@
           <a:p>
             <a:fld id="{48A87A34-81AB-432B-8DAE-1953F412C126}" type="datetimeFigureOut">
               <a:rPr lang="en-US" dirty="0"/>
-              <a:t>05-Jun-18</a:t>
+              <a:t>09-Jun-18</a:t>
             </a:fld>
             <a:endParaRPr lang="en-US" dirty="0"/>
           </a:p>
@@ -4845,7 +4845,7 @@
           <a:p>
             <a:fld id="{48A87A34-81AB-432B-8DAE-1953F412C126}" type="datetimeFigureOut">
               <a:rPr lang="en-US" dirty="0"/>
-              <a:t>05-Jun-18</a:t>
+              <a:t>09-Jun-18</a:t>
             </a:fld>
             <a:endParaRPr lang="en-US" dirty="0"/>
           </a:p>
@@ -5103,7 +5103,7 @@
           <a:p>
             <a:fld id="{48A87A34-81AB-432B-8DAE-1953F412C126}" type="datetimeFigureOut">
               <a:rPr lang="en-US" dirty="0"/>
-              <a:t>05-Jun-18</a:t>
+              <a:t>09-Jun-18</a:t>
             </a:fld>
             <a:endParaRPr lang="en-US" dirty="0"/>
           </a:p>
@@ -5532,7 +5532,7 @@
           <a:p>
             <a:fld id="{48A87A34-81AB-432B-8DAE-1953F412C126}" type="datetimeFigureOut">
               <a:rPr lang="en-US" dirty="0"/>
-              <a:t>05-Jun-18</a:t>
+              <a:t>09-Jun-18</a:t>
             </a:fld>
             <a:endParaRPr lang="en-US" dirty="0"/>
           </a:p>
@@ -6073,7 +6073,7 @@
           <a:p>
             <a:fld id="{48A87A34-81AB-432B-8DAE-1953F412C126}" type="datetimeFigureOut">
               <a:rPr lang="en-US" dirty="0"/>
-              <a:t>05-Jun-18</a:t>
+              <a:t>09-Jun-18</a:t>
             </a:fld>
             <a:endParaRPr lang="en-US" dirty="0"/>
           </a:p>
@@ -6788,7 +6788,7 @@
           <a:p>
             <a:fld id="{48A87A34-81AB-432B-8DAE-1953F412C126}" type="datetimeFigureOut">
               <a:rPr lang="en-US" dirty="0"/>
-              <a:t>05-Jun-18</a:t>
+              <a:t>09-Jun-18</a:t>
             </a:fld>
             <a:endParaRPr lang="en-US" dirty="0"/>
           </a:p>
@@ -6953,7 +6953,7 @@
           <a:p>
             <a:fld id="{48A87A34-81AB-432B-8DAE-1953F412C126}" type="datetimeFigureOut">
               <a:rPr lang="en-US" dirty="0"/>
-              <a:t>05-Jun-18</a:t>
+              <a:t>09-Jun-18</a:t>
             </a:fld>
             <a:endParaRPr lang="en-US" dirty="0"/>
           </a:p>
@@ -7128,7 +7128,7 @@
           <a:p>
             <a:fld id="{48A87A34-81AB-432B-8DAE-1953F412C126}" type="datetimeFigureOut">
               <a:rPr lang="en-US" dirty="0"/>
-              <a:t>05-Jun-18</a:t>
+              <a:t>09-Jun-18</a:t>
             </a:fld>
             <a:endParaRPr lang="en-US" dirty="0"/>
           </a:p>
@@ -7293,7 +7293,7 @@
           <a:p>
             <a:fld id="{48A87A34-81AB-432B-8DAE-1953F412C126}" type="datetimeFigureOut">
               <a:rPr lang="en-US" dirty="0"/>
-              <a:t>05-Jun-18</a:t>
+              <a:t>09-Jun-18</a:t>
             </a:fld>
             <a:endParaRPr lang="en-US" dirty="0"/>
           </a:p>
@@ -7538,7 +7538,7 @@
           <a:p>
             <a:fld id="{48A87A34-81AB-432B-8DAE-1953F412C126}" type="datetimeFigureOut">
               <a:rPr lang="en-US" dirty="0"/>
-              <a:t>05-Jun-18</a:t>
+              <a:t>09-Jun-18</a:t>
             </a:fld>
             <a:endParaRPr lang="en-US" dirty="0"/>
           </a:p>
@@ -7765,7 +7765,7 @@
           <a:p>
             <a:fld id="{48A87A34-81AB-432B-8DAE-1953F412C126}" type="datetimeFigureOut">
               <a:rPr lang="en-US" dirty="0"/>
-              <a:t>05-Jun-18</a:t>
+              <a:t>09-Jun-18</a:t>
             </a:fld>
             <a:endParaRPr lang="en-US" dirty="0"/>
           </a:p>
@@ -8141,7 +8141,7 @@
           <a:p>
             <a:fld id="{48A87A34-81AB-432B-8DAE-1953F412C126}" type="datetimeFigureOut">
               <a:rPr lang="en-US" dirty="0"/>
-              <a:t>05-Jun-18</a:t>
+              <a:t>09-Jun-18</a:t>
             </a:fld>
             <a:endParaRPr lang="en-US" dirty="0"/>
           </a:p>
@@ -8254,7 +8254,7 @@
           <a:p>
             <a:fld id="{48A87A34-81AB-432B-8DAE-1953F412C126}" type="datetimeFigureOut">
               <a:rPr lang="en-US" dirty="0"/>
-              <a:t>05-Jun-18</a:t>
+              <a:t>09-Jun-18</a:t>
             </a:fld>
             <a:endParaRPr lang="en-US" dirty="0"/>
           </a:p>
@@ -8344,7 +8344,7 @@
           <a:p>
             <a:fld id="{48A87A34-81AB-432B-8DAE-1953F412C126}" type="datetimeFigureOut">
               <a:rPr lang="en-US" dirty="0"/>
-              <a:t>05-Jun-18</a:t>
+              <a:t>09-Jun-18</a:t>
             </a:fld>
             <a:endParaRPr lang="en-US" dirty="0"/>
           </a:p>
@@ -8588,7 +8588,7 @@
           <a:p>
             <a:fld id="{48A87A34-81AB-432B-8DAE-1953F412C126}" type="datetimeFigureOut">
               <a:rPr lang="en-US" dirty="0"/>
-              <a:t>05-Jun-18</a:t>
+              <a:t>09-Jun-18</a:t>
             </a:fld>
             <a:endParaRPr lang="en-US" dirty="0"/>
           </a:p>
@@ -8863,7 +8863,7 @@
           <a:p>
             <a:fld id="{48A87A34-81AB-432B-8DAE-1953F412C126}" type="datetimeFigureOut">
               <a:rPr lang="en-US" dirty="0"/>
-              <a:t>05-Jun-18</a:t>
+              <a:t>09-Jun-18</a:t>
             </a:fld>
             <a:endParaRPr lang="en-US" dirty="0"/>
           </a:p>
@@ -8974,7 +8974,7 @@
           <a:noFill/>
           <a:extLst>
             <a:ext uri="{909E8E84-426E-40dd-AFC4-6F175D3DCCD1}">
-              <a14:hiddenFill xmlns="" xmlns:a14="http://schemas.microsoft.com/office/drawing/2010/main">
+              <a14:hiddenFill xmlns:a14="http://schemas.microsoft.com/office/drawing/2010/main" xmlns="">
                 <a:solidFill>
                   <a:srgbClr val="FFFFFF"/>
                 </a:solidFill>
@@ -9048,7 +9048,7 @@
               </a:ln>
               <a:extLst>
                 <a:ext uri="{91240B29-F687-4f45-9708-019B960494DF}">
-                  <a14:hiddenLine xmlns="" xmlns:a14="http://schemas.microsoft.com/office/drawing/2010/main" w="9525">
+                  <a14:hiddenLine xmlns:a14="http://schemas.microsoft.com/office/drawing/2010/main" xmlns="" w="9525">
                     <a:solidFill>
                       <a:srgbClr val="000000"/>
                     </a:solidFill>
@@ -9138,7 +9138,7 @@
               </a:ln>
               <a:extLst>
                 <a:ext uri="{91240B29-F687-4f45-9708-019B960494DF}">
-                  <a14:hiddenLine xmlns="" xmlns:a14="http://schemas.microsoft.com/office/drawing/2010/main" w="9525">
+                  <a14:hiddenLine xmlns:a14="http://schemas.microsoft.com/office/drawing/2010/main" xmlns="" w="9525">
                     <a:solidFill>
                       <a:srgbClr val="000000"/>
                     </a:solidFill>
@@ -9228,7 +9228,7 @@
               </a:ln>
               <a:extLst>
                 <a:ext uri="{91240B29-F687-4f45-9708-019B960494DF}">
-                  <a14:hiddenLine xmlns="" xmlns:a14="http://schemas.microsoft.com/office/drawing/2010/main" w="9525">
+                  <a14:hiddenLine xmlns:a14="http://schemas.microsoft.com/office/drawing/2010/main" xmlns="" w="9525">
                     <a:solidFill>
                       <a:srgbClr val="000000"/>
                     </a:solidFill>
@@ -9290,7 +9290,7 @@
               </a:ln>
               <a:extLst>
                 <a:ext uri="{91240B29-F687-4f45-9708-019B960494DF}">
-                  <a14:hiddenLine xmlns="" xmlns:a14="http://schemas.microsoft.com/office/drawing/2010/main" w="9525">
+                  <a14:hiddenLine xmlns:a14="http://schemas.microsoft.com/office/drawing/2010/main" xmlns="" w="9525">
                     <a:solidFill>
                       <a:srgbClr val="000000"/>
                     </a:solidFill>
@@ -9380,7 +9380,7 @@
               </a:ln>
               <a:extLst>
                 <a:ext uri="{91240B29-F687-4f45-9708-019B960494DF}">
-                  <a14:hiddenLine xmlns="" xmlns:a14="http://schemas.microsoft.com/office/drawing/2010/main" w="9525">
+                  <a14:hiddenLine xmlns:a14="http://schemas.microsoft.com/office/drawing/2010/main" xmlns="" w="9525">
                     <a:solidFill>
                       <a:srgbClr val="000000"/>
                     </a:solidFill>
@@ -9442,7 +9442,7 @@
               </a:ln>
               <a:extLst>
                 <a:ext uri="{91240B29-F687-4f45-9708-019B960494DF}">
-                  <a14:hiddenLine xmlns="" xmlns:a14="http://schemas.microsoft.com/office/drawing/2010/main" w="9525">
+                  <a14:hiddenLine xmlns:a14="http://schemas.microsoft.com/office/drawing/2010/main" xmlns="" w="9525">
                     <a:solidFill>
                       <a:srgbClr val="000000"/>
                     </a:solidFill>
@@ -9504,7 +9504,7 @@
               </a:ln>
               <a:extLst>
                 <a:ext uri="{91240B29-F687-4f45-9708-019B960494DF}">
-                  <a14:hiddenLine xmlns="" xmlns:a14="http://schemas.microsoft.com/office/drawing/2010/main" w="9525">
+                  <a14:hiddenLine xmlns:a14="http://schemas.microsoft.com/office/drawing/2010/main" xmlns="" w="9525">
                     <a:solidFill>
                       <a:srgbClr val="000000"/>
                     </a:solidFill>
@@ -9594,7 +9594,7 @@
               </a:ln>
               <a:extLst>
                 <a:ext uri="{91240B29-F687-4f45-9708-019B960494DF}">
-                  <a14:hiddenLine xmlns="" xmlns:a14="http://schemas.microsoft.com/office/drawing/2010/main" w="9525">
+                  <a14:hiddenLine xmlns:a14="http://schemas.microsoft.com/office/drawing/2010/main" xmlns="" w="9525">
                     <a:solidFill>
                       <a:srgbClr val="000000"/>
                     </a:solidFill>
@@ -9684,7 +9684,7 @@
               </a:ln>
               <a:extLst>
                 <a:ext uri="{91240B29-F687-4f45-9708-019B960494DF}">
-                  <a14:hiddenLine xmlns="" xmlns:a14="http://schemas.microsoft.com/office/drawing/2010/main" w="9525">
+                  <a14:hiddenLine xmlns:a14="http://schemas.microsoft.com/office/drawing/2010/main" xmlns="" w="9525">
                     <a:solidFill>
                       <a:srgbClr val="000000"/>
                     </a:solidFill>
@@ -9746,7 +9746,7 @@
               </a:ln>
               <a:extLst>
                 <a:ext uri="{91240B29-F687-4f45-9708-019B960494DF}">
-                  <a14:hiddenLine xmlns="" xmlns:a14="http://schemas.microsoft.com/office/drawing/2010/main" w="9525">
+                  <a14:hiddenLine xmlns:a14="http://schemas.microsoft.com/office/drawing/2010/main" xmlns="" w="9525">
                     <a:solidFill>
                       <a:srgbClr val="000000"/>
                     </a:solidFill>
@@ -9856,7 +9856,7 @@
               </a:ln>
               <a:extLst>
                 <a:ext uri="{91240B29-F687-4f45-9708-019B960494DF}">
-                  <a14:hiddenLine xmlns="" xmlns:a14="http://schemas.microsoft.com/office/drawing/2010/main" w="9525">
+                  <a14:hiddenLine xmlns:a14="http://schemas.microsoft.com/office/drawing/2010/main" xmlns="" w="9525">
                     <a:solidFill>
                       <a:srgbClr val="000000"/>
                     </a:solidFill>
@@ -9940,7 +9940,7 @@
               </a:ln>
               <a:extLst>
                 <a:ext uri="{91240B29-F687-4f45-9708-019B960494DF}">
-                  <a14:hiddenLine xmlns="" xmlns:a14="http://schemas.microsoft.com/office/drawing/2010/main" w="9525">
+                  <a14:hiddenLine xmlns:a14="http://schemas.microsoft.com/office/drawing/2010/main" xmlns="" w="9525">
                     <a:solidFill>
                       <a:srgbClr val="000000"/>
                     </a:solidFill>
@@ -10002,7 +10002,7 @@
               </a:ln>
               <a:extLst>
                 <a:ext uri="{91240B29-F687-4f45-9708-019B960494DF}">
-                  <a14:hiddenLine xmlns="" xmlns:a14="http://schemas.microsoft.com/office/drawing/2010/main" w="9525">
+                  <a14:hiddenLine xmlns:a14="http://schemas.microsoft.com/office/drawing/2010/main" xmlns="" w="9525">
                     <a:solidFill>
                       <a:srgbClr val="000000"/>
                     </a:solidFill>
@@ -10064,7 +10064,7 @@
               </a:ln>
               <a:extLst>
                 <a:ext uri="{91240B29-F687-4f45-9708-019B960494DF}">
-                  <a14:hiddenLine xmlns="" xmlns:a14="http://schemas.microsoft.com/office/drawing/2010/main" w="9525">
+                  <a14:hiddenLine xmlns:a14="http://schemas.microsoft.com/office/drawing/2010/main" xmlns="" w="9525">
                     <a:solidFill>
                       <a:srgbClr val="000000"/>
                     </a:solidFill>
@@ -10154,7 +10154,7 @@
               </a:ln>
               <a:extLst>
                 <a:ext uri="{91240B29-F687-4f45-9708-019B960494DF}">
-                  <a14:hiddenLine xmlns="" xmlns:a14="http://schemas.microsoft.com/office/drawing/2010/main" w="9525">
+                  <a14:hiddenLine xmlns:a14="http://schemas.microsoft.com/office/drawing/2010/main" xmlns="" w="9525">
                     <a:solidFill>
                       <a:srgbClr val="000000"/>
                     </a:solidFill>
@@ -10188,7 +10188,7 @@
               </a:ln>
               <a:extLst>
                 <a:ext uri="{91240B29-F687-4f45-9708-019B960494DF}">
-                  <a14:hiddenLine xmlns="" xmlns:a14="http://schemas.microsoft.com/office/drawing/2010/main" w="9525">
+                  <a14:hiddenLine xmlns:a14="http://schemas.microsoft.com/office/drawing/2010/main" xmlns="" w="9525">
                     <a:solidFill>
                       <a:srgbClr val="000000"/>
                     </a:solidFill>
@@ -10253,7 +10253,7 @@
               </a:ln>
               <a:extLst>
                 <a:ext uri="{91240B29-F687-4f45-9708-019B960494DF}">
-                  <a14:hiddenLine xmlns="" xmlns:a14="http://schemas.microsoft.com/office/drawing/2010/main" w="9525">
+                  <a14:hiddenLine xmlns:a14="http://schemas.microsoft.com/office/drawing/2010/main" xmlns="" w="9525">
                     <a:solidFill>
                       <a:srgbClr val="000000"/>
                     </a:solidFill>
@@ -10343,7 +10343,7 @@
               </a:ln>
               <a:extLst>
                 <a:ext uri="{91240B29-F687-4f45-9708-019B960494DF}">
-                  <a14:hiddenLine xmlns="" xmlns:a14="http://schemas.microsoft.com/office/drawing/2010/main" w="9525">
+                  <a14:hiddenLine xmlns:a14="http://schemas.microsoft.com/office/drawing/2010/main" xmlns="" w="9525">
                     <a:solidFill>
                       <a:srgbClr val="000000"/>
                     </a:solidFill>
@@ -10405,7 +10405,7 @@
               </a:ln>
               <a:extLst>
                 <a:ext uri="{91240B29-F687-4f45-9708-019B960494DF}">
-                  <a14:hiddenLine xmlns="" xmlns:a14="http://schemas.microsoft.com/office/drawing/2010/main" w="9525">
+                  <a14:hiddenLine xmlns:a14="http://schemas.microsoft.com/office/drawing/2010/main" xmlns="" w="9525">
                     <a:solidFill>
                       <a:srgbClr val="000000"/>
                     </a:solidFill>
@@ -10495,7 +10495,7 @@
               </a:ln>
               <a:extLst>
                 <a:ext uri="{91240B29-F687-4f45-9708-019B960494DF}">
-                  <a14:hiddenLine xmlns="" xmlns:a14="http://schemas.microsoft.com/office/drawing/2010/main" w="9525">
+                  <a14:hiddenLine xmlns:a14="http://schemas.microsoft.com/office/drawing/2010/main" xmlns="" w="9525">
                     <a:solidFill>
                       <a:srgbClr val="000000"/>
                     </a:solidFill>
@@ -10560,7 +10560,7 @@
               </a:ln>
               <a:extLst>
                 <a:ext uri="{91240B29-F687-4f45-9708-019B960494DF}">
-                  <a14:hiddenLine xmlns="" xmlns:a14="http://schemas.microsoft.com/office/drawing/2010/main" w="9525">
+                  <a14:hiddenLine xmlns:a14="http://schemas.microsoft.com/office/drawing/2010/main" xmlns="" w="9525">
                     <a:solidFill>
                       <a:srgbClr val="000000"/>
                     </a:solidFill>
@@ -10622,7 +10622,7 @@
               </a:ln>
               <a:extLst>
                 <a:ext uri="{91240B29-F687-4f45-9708-019B960494DF}">
-                  <a14:hiddenLine xmlns="" xmlns:a14="http://schemas.microsoft.com/office/drawing/2010/main" w="9525">
+                  <a14:hiddenLine xmlns:a14="http://schemas.microsoft.com/office/drawing/2010/main" xmlns="" w="9525">
                     <a:solidFill>
                       <a:srgbClr val="000000"/>
                     </a:solidFill>
@@ -10712,7 +10712,7 @@
               </a:ln>
               <a:extLst>
                 <a:ext uri="{91240B29-F687-4f45-9708-019B960494DF}">
-                  <a14:hiddenLine xmlns="" xmlns:a14="http://schemas.microsoft.com/office/drawing/2010/main" w="9525">
+                  <a14:hiddenLine xmlns:a14="http://schemas.microsoft.com/office/drawing/2010/main" xmlns="" w="9525">
                     <a:solidFill>
                       <a:srgbClr val="000000"/>
                     </a:solidFill>
@@ -10802,7 +10802,7 @@
               </a:ln>
               <a:extLst>
                 <a:ext uri="{91240B29-F687-4f45-9708-019B960494DF}">
-                  <a14:hiddenLine xmlns="" xmlns:a14="http://schemas.microsoft.com/office/drawing/2010/main" w="9525">
+                  <a14:hiddenLine xmlns:a14="http://schemas.microsoft.com/office/drawing/2010/main" xmlns="" w="9525">
                     <a:solidFill>
                       <a:srgbClr val="000000"/>
                     </a:solidFill>
@@ -10867,7 +10867,7 @@
               </a:ln>
               <a:extLst>
                 <a:ext uri="{91240B29-F687-4f45-9708-019B960494DF}">
-                  <a14:hiddenLine xmlns="" xmlns:a14="http://schemas.microsoft.com/office/drawing/2010/main" w="9525">
+                  <a14:hiddenLine xmlns:a14="http://schemas.microsoft.com/office/drawing/2010/main" xmlns="" w="9525">
                     <a:solidFill>
                       <a:srgbClr val="000000"/>
                     </a:solidFill>
@@ -10987,7 +10987,7 @@
               </a:ln>
               <a:extLst>
                 <a:ext uri="{91240B29-F687-4f45-9708-019B960494DF}">
-                  <a14:hiddenLine xmlns="" xmlns:a14="http://schemas.microsoft.com/office/drawing/2010/main" w="9525">
+                  <a14:hiddenLine xmlns:a14="http://schemas.microsoft.com/office/drawing/2010/main" xmlns="" w="9525">
                     <a:solidFill>
                       <a:srgbClr val="000000"/>
                     </a:solidFill>
@@ -11085,7 +11085,7 @@
               </a:ln>
               <a:extLst>
                 <a:ext uri="{91240B29-F687-4f45-9708-019B960494DF}">
-                  <a14:hiddenLine xmlns="" xmlns:a14="http://schemas.microsoft.com/office/drawing/2010/main" w="9525">
+                  <a14:hiddenLine xmlns:a14="http://schemas.microsoft.com/office/drawing/2010/main" xmlns="" w="9525">
                     <a:solidFill>
                       <a:srgbClr val="000000"/>
                     </a:solidFill>
@@ -11200,7 +11200,7 @@
               </a:ln>
               <a:extLst>
                 <a:ext uri="{91240B29-F687-4f45-9708-019B960494DF}">
-                  <a14:hiddenLine xmlns="" xmlns:a14="http://schemas.microsoft.com/office/drawing/2010/main" w="9525">
+                  <a14:hiddenLine xmlns:a14="http://schemas.microsoft.com/office/drawing/2010/main" xmlns="" w="9525">
                     <a:solidFill>
                       <a:srgbClr val="000000"/>
                     </a:solidFill>
@@ -11290,7 +11290,7 @@
               </a:ln>
               <a:extLst>
                 <a:ext uri="{91240B29-F687-4f45-9708-019B960494DF}">
-                  <a14:hiddenLine xmlns="" xmlns:a14="http://schemas.microsoft.com/office/drawing/2010/main" w="9525">
+                  <a14:hiddenLine xmlns:a14="http://schemas.microsoft.com/office/drawing/2010/main" xmlns="" w="9525">
                     <a:solidFill>
                       <a:srgbClr val="000000"/>
                     </a:solidFill>
@@ -11355,7 +11355,7 @@
               </a:ln>
               <a:extLst>
                 <a:ext uri="{91240B29-F687-4f45-9708-019B960494DF}">
-                  <a14:hiddenLine xmlns="" xmlns:a14="http://schemas.microsoft.com/office/drawing/2010/main" w="9525">
+                  <a14:hiddenLine xmlns:a14="http://schemas.microsoft.com/office/drawing/2010/main" xmlns="" w="9525">
                     <a:solidFill>
                       <a:srgbClr val="000000"/>
                     </a:solidFill>
@@ -11445,7 +11445,7 @@
               </a:ln>
               <a:extLst>
                 <a:ext uri="{91240B29-F687-4f45-9708-019B960494DF}">
-                  <a14:hiddenLine xmlns="" xmlns:a14="http://schemas.microsoft.com/office/drawing/2010/main" w="9525">
+                  <a14:hiddenLine xmlns:a14="http://schemas.microsoft.com/office/drawing/2010/main" xmlns="" w="9525">
                     <a:solidFill>
                       <a:srgbClr val="000000"/>
                     </a:solidFill>
@@ -11513,7 +11513,7 @@
               </a:ln>
               <a:extLst>
                 <a:ext uri="{91240B29-F687-4f45-9708-019B960494DF}">
-                  <a14:hiddenLine xmlns="" xmlns:a14="http://schemas.microsoft.com/office/drawing/2010/main" w="9525">
+                  <a14:hiddenLine xmlns:a14="http://schemas.microsoft.com/office/drawing/2010/main" xmlns="" w="9525">
                     <a:solidFill>
                       <a:srgbClr val="000000"/>
                     </a:solidFill>
@@ -11603,7 +11603,7 @@
               </a:ln>
               <a:extLst>
                 <a:ext uri="{91240B29-F687-4f45-9708-019B960494DF}">
-                  <a14:hiddenLine xmlns="" xmlns:a14="http://schemas.microsoft.com/office/drawing/2010/main" w="9525">
+                  <a14:hiddenLine xmlns:a14="http://schemas.microsoft.com/office/drawing/2010/main" xmlns="" w="9525">
                     <a:solidFill>
                       <a:srgbClr val="000000"/>
                     </a:solidFill>
@@ -11671,7 +11671,7 @@
               </a:ln>
               <a:extLst>
                 <a:ext uri="{91240B29-F687-4f45-9708-019B960494DF}">
-                  <a14:hiddenLine xmlns="" xmlns:a14="http://schemas.microsoft.com/office/drawing/2010/main" w="9525">
+                  <a14:hiddenLine xmlns:a14="http://schemas.microsoft.com/office/drawing/2010/main" xmlns="" w="9525">
                     <a:solidFill>
                       <a:srgbClr val="000000"/>
                     </a:solidFill>
@@ -11761,7 +11761,7 @@
               </a:ln>
               <a:extLst>
                 <a:ext uri="{91240B29-F687-4f45-9708-019B960494DF}">
-                  <a14:hiddenLine xmlns="" xmlns:a14="http://schemas.microsoft.com/office/drawing/2010/main" w="9525">
+                  <a14:hiddenLine xmlns:a14="http://schemas.microsoft.com/office/drawing/2010/main" xmlns="" w="9525">
                     <a:solidFill>
                       <a:srgbClr val="000000"/>
                     </a:solidFill>
@@ -11795,7 +11795,7 @@
               </a:ln>
               <a:extLst>
                 <a:ext uri="{91240B29-F687-4f45-9708-019B960494DF}">
-                  <a14:hiddenLine xmlns="" xmlns:a14="http://schemas.microsoft.com/office/drawing/2010/main" w="9525">
+                  <a14:hiddenLine xmlns:a14="http://schemas.microsoft.com/office/drawing/2010/main" xmlns="" w="9525">
                     <a:solidFill>
                       <a:srgbClr val="000000"/>
                     </a:solidFill>
@@ -11936,7 +11936,7 @@
             <a:fld id="{48A87A34-81AB-432B-8DAE-1953F412C126}" type="datetimeFigureOut">
               <a:rPr lang="en-US" dirty="0"/>
               <a:pPr/>
-              <a:t>05-Jun-18</a:t>
+              <a:t>09-Jun-18</a:t>
             </a:fld>
             <a:endParaRPr lang="en-US" dirty="0"/>
           </a:p>

</xml_diff>